<commit_message>
SDE exam preview ready for 2023.10.26 lecture
</commit_message>
<xml_diff>
--- a/lectures/07_SDE_exam-preview/07_Streaming-Data-Engineering_exam-preview.pptx
+++ b/lectures/07_SDE_exam-preview/07_Streaming-Data-Engineering_exam-preview.pptx
@@ -5,18 +5,19 @@
     <p:sldMasterId id="2147483660" r:id="rId1"/>
   </p:sldMasterIdLst>
   <p:notesMasterIdLst>
-    <p:notesMasterId r:id="rId11"/>
+    <p:notesMasterId r:id="rId12"/>
   </p:notesMasterIdLst>
   <p:sldIdLst>
     <p:sldId id="1140" r:id="rId2"/>
     <p:sldId id="1144" r:id="rId3"/>
     <p:sldId id="1143" r:id="rId4"/>
-    <p:sldId id="1145" r:id="rId5"/>
-    <p:sldId id="1154" r:id="rId6"/>
-    <p:sldId id="1148" r:id="rId7"/>
-    <p:sldId id="1146" r:id="rId8"/>
-    <p:sldId id="1151" r:id="rId9"/>
-    <p:sldId id="1153" r:id="rId10"/>
+    <p:sldId id="1155" r:id="rId5"/>
+    <p:sldId id="1145" r:id="rId6"/>
+    <p:sldId id="1154" r:id="rId7"/>
+    <p:sldId id="1148" r:id="rId8"/>
+    <p:sldId id="1146" r:id="rId9"/>
+    <p:sldId id="1151" r:id="rId10"/>
+    <p:sldId id="1153" r:id="rId11"/>
   </p:sldIdLst>
   <p:sldSz cx="12192000" cy="6858000"/>
   <p:notesSz cx="6858000" cy="9144000"/>
@@ -205,7 +206,7 @@
           <a:p>
             <a:fld id="{26455981-B11C-FF41-9507-47548C7C8AB8}" type="datetimeFigureOut">
               <a:rPr lang="en-US" smtClean="0"/>
-              <a:t>11/1/22</a:t>
+              <a:t>10/25/23</a:t>
             </a:fld>
             <a:endParaRPr lang="en-US"/>
           </a:p>
@@ -4976,6 +4977,247 @@
 </p:sld>
 </file>
 
+<file path=ppt/slides/slide10.xml><?xml version="1.0" encoding="utf-8"?>
+<p:sld xmlns:a="http://schemas.openxmlformats.org/drawingml/2006/main" xmlns:r="http://schemas.openxmlformats.org/officeDocument/2006/relationships" xmlns:p="http://schemas.openxmlformats.org/presentationml/2006/main">
+  <p:cSld>
+    <p:spTree>
+      <p:nvGrpSpPr>
+        <p:cNvPr id="1" name=""/>
+        <p:cNvGrpSpPr/>
+        <p:nvPr/>
+      </p:nvGrpSpPr>
+      <p:grpSpPr>
+        <a:xfrm>
+          <a:off x="0" y="0"/>
+          <a:ext cx="0" cy="0"/>
+          <a:chOff x="0" y="0"/>
+          <a:chExt cx="0" cy="0"/>
+        </a:xfrm>
+      </p:grpSpPr>
+      <p:sp>
+        <p:nvSpPr>
+          <p:cNvPr id="2" name="Subtitle 1">
+            <a:extLst>
+              <a:ext uri="{FF2B5EF4-FFF2-40B4-BE49-F238E27FC236}">
+                <a16:creationId xmlns:a16="http://schemas.microsoft.com/office/drawing/2014/main" id="{5844CE45-509E-F649-90A4-98FCBA6E2423}"/>
+              </a:ext>
+            </a:extLst>
+          </p:cNvPr>
+          <p:cNvSpPr>
+            <a:spLocks noGrp="1"/>
+          </p:cNvSpPr>
+          <p:nvPr>
+            <p:ph type="subTitle" idx="1"/>
+          </p:nvPr>
+        </p:nvSpPr>
+        <p:spPr/>
+        <p:txBody>
+          <a:bodyPr/>
+          <a:lstStyle/>
+          <a:p>
+            <a:pPr marL="177796" indent="-177796">
+              <a:spcBef>
+                <a:spcPts val="0"/>
+              </a:spcBef>
+              <a:buClr>
+                <a:schemeClr val="lt1"/>
+              </a:buClr>
+              <a:buSzPts val="1800"/>
+            </a:pPr>
+            <a:r>
+              <a:rPr lang="en" b="1" dirty="0">
+                <a:solidFill>
+                  <a:schemeClr val="tx1"/>
+                </a:solidFill>
+                <a:latin typeface="Helvetica Neue Light"/>
+                <a:ea typeface="Helvetica Neue Light"/>
+                <a:cs typeface="Helvetica Neue Light"/>
+                <a:sym typeface="Helvetica Neue Light"/>
+              </a:rPr>
+              <a:t>Emanuele Della Valle</a:t>
+            </a:r>
+          </a:p>
+          <a:p>
+            <a:pPr marL="177796" indent="-177796">
+              <a:spcBef>
+                <a:spcPts val="0"/>
+              </a:spcBef>
+              <a:buClr>
+                <a:schemeClr val="lt1"/>
+              </a:buClr>
+              <a:buSzPts val="1800"/>
+            </a:pPr>
+            <a:r>
+              <a:rPr lang="en" sz="1800" dirty="0" err="1">
+                <a:solidFill>
+                  <a:schemeClr val="tx1"/>
+                </a:solidFill>
+                <a:latin typeface="Helvetica Neue Light"/>
+                <a:ea typeface="Helvetica Neue Light"/>
+                <a:cs typeface="Helvetica Neue Light"/>
+                <a:sym typeface="Helvetica Neue Light"/>
+              </a:rPr>
+              <a:t>Politecnico</a:t>
+            </a:r>
+            <a:r>
+              <a:rPr lang="en" sz="1800" dirty="0">
+                <a:solidFill>
+                  <a:schemeClr val="tx1"/>
+                </a:solidFill>
+                <a:latin typeface="Helvetica Neue Light"/>
+                <a:ea typeface="Helvetica Neue Light"/>
+                <a:cs typeface="Helvetica Neue Light"/>
+                <a:sym typeface="Helvetica Neue Light"/>
+              </a:rPr>
+              <a:t> di Milano </a:t>
+            </a:r>
+          </a:p>
+        </p:txBody>
+      </p:sp>
+      <p:sp>
+        <p:nvSpPr>
+          <p:cNvPr id="3" name="Title 2">
+            <a:extLst>
+              <a:ext uri="{FF2B5EF4-FFF2-40B4-BE49-F238E27FC236}">
+                <a16:creationId xmlns:a16="http://schemas.microsoft.com/office/drawing/2014/main" id="{05E3092D-C75E-7446-AFAD-75E4D4F36537}"/>
+              </a:ext>
+            </a:extLst>
+          </p:cNvPr>
+          <p:cNvSpPr>
+            <a:spLocks noGrp="1"/>
+          </p:cNvSpPr>
+          <p:nvPr>
+            <p:ph type="title"/>
+          </p:nvPr>
+        </p:nvSpPr>
+        <p:spPr>
+          <a:xfrm>
+            <a:off x="960228" y="2531006"/>
+            <a:ext cx="6777003" cy="1795989"/>
+          </a:xfrm>
+        </p:spPr>
+        <p:txBody>
+          <a:bodyPr/>
+          <a:lstStyle/>
+          <a:p>
+            <a:r>
+              <a:rPr lang="en" sz="2000" b="1">
+                <a:solidFill>
+                  <a:schemeClr val="tx1"/>
+                </a:solidFill>
+              </a:rPr>
+              <a:t>Streaming Data Analytics </a:t>
+            </a:r>
+            <a:br>
+              <a:rPr lang="en" sz="3200" b="1">
+                <a:solidFill>
+                  <a:schemeClr val="tx1"/>
+                </a:solidFill>
+              </a:rPr>
+            </a:br>
+            <a:r>
+              <a:rPr lang="en" sz="3200" b="1">
+                <a:solidFill>
+                  <a:schemeClr val="tx1"/>
+                </a:solidFill>
+              </a:rPr>
+              <a:t>Preview of the </a:t>
+            </a:r>
+            <a:br>
+              <a:rPr lang="en" sz="3200" b="1">
+                <a:solidFill>
+                  <a:schemeClr val="tx1"/>
+                </a:solidFill>
+              </a:rPr>
+            </a:br>
+            <a:r>
+              <a:rPr lang="en" sz="3200" b="1">
+                <a:solidFill>
+                  <a:schemeClr val="tx1"/>
+                </a:solidFill>
+              </a:rPr>
+              <a:t>part of the exam about </a:t>
+            </a:r>
+            <a:br>
+              <a:rPr lang="en" sz="3200" b="1">
+                <a:solidFill>
+                  <a:schemeClr val="tx1"/>
+                </a:solidFill>
+              </a:rPr>
+            </a:br>
+            <a:r>
+              <a:rPr lang="en" sz="3200" b="1">
+                <a:solidFill>
+                  <a:schemeClr val="tx1"/>
+                </a:solidFill>
+              </a:rPr>
+              <a:t>Streaming Data Engineering</a:t>
+            </a:r>
+            <a:endParaRPr lang="en-US" sz="4267" b="1" dirty="0">
+              <a:solidFill>
+                <a:schemeClr val="tx1"/>
+              </a:solidFill>
+            </a:endParaRPr>
+          </a:p>
+        </p:txBody>
+      </p:sp>
+      <p:sp>
+        <p:nvSpPr>
+          <p:cNvPr id="4" name="TextBox 3">
+            <a:extLst>
+              <a:ext uri="{FF2B5EF4-FFF2-40B4-BE49-F238E27FC236}">
+                <a16:creationId xmlns:a16="http://schemas.microsoft.com/office/drawing/2014/main" id="{8B388D4E-0571-CE4D-A7E6-D64A0DA6C4F5}"/>
+              </a:ext>
+            </a:extLst>
+          </p:cNvPr>
+          <p:cNvSpPr txBox="1"/>
+          <p:nvPr/>
+        </p:nvSpPr>
+        <p:spPr>
+          <a:xfrm>
+            <a:off x="3087445" y="4098664"/>
+            <a:ext cx="184731" cy="369332"/>
+          </a:xfrm>
+          <a:prstGeom prst="rect">
+            <a:avLst/>
+          </a:prstGeom>
+          <a:noFill/>
+        </p:spPr>
+        <p:txBody>
+          <a:bodyPr wrap="none" rtlCol="0">
+            <a:spAutoFit/>
+          </a:bodyPr>
+          <a:lstStyle/>
+          <a:p>
+            <a:endParaRPr lang="it-IT" dirty="0"/>
+          </a:p>
+        </p:txBody>
+      </p:sp>
+    </p:spTree>
+    <p:extLst>
+      <p:ext uri="{BB962C8B-B14F-4D97-AF65-F5344CB8AC3E}">
+        <p14:creationId xmlns:p14="http://schemas.microsoft.com/office/powerpoint/2010/main" val="1485291633"/>
+      </p:ext>
+    </p:extLst>
+  </p:cSld>
+  <p:clrMapOvr>
+    <a:masterClrMapping/>
+  </p:clrMapOvr>
+  <mc:AlternateContent xmlns:mc="http://schemas.openxmlformats.org/markup-compatibility/2006" xmlns:p14="http://schemas.microsoft.com/office/powerpoint/2010/main">
+    <mc:Choice Requires="p14">
+      <p:transition spd="med" p14:dur="700">
+        <p:fade/>
+      </p:transition>
+    </mc:Choice>
+    <mc:Fallback xmlns="">
+      <p:transition spd="med">
+        <p:fade/>
+      </p:transition>
+    </mc:Fallback>
+  </mc:AlternateContent>
+</p:sld>
+</file>
+
 <file path=ppt/slides/slide2.xml><?xml version="1.0" encoding="utf-8"?>
 <p:sld xmlns:a="http://schemas.openxmlformats.org/drawingml/2006/main" xmlns:r="http://schemas.openxmlformats.org/officeDocument/2006/relationships" xmlns:p="http://schemas.openxmlformats.org/presentationml/2006/main">
   <p:cSld>
@@ -5015,20 +5257,8 @@
           <a:lstStyle/>
           <a:p>
             <a:r>
-              <a:rPr lang="it-IT" dirty="0" err="1"/>
-              <a:t>Exam</a:t>
-            </a:r>
-            <a:r>
-              <a:rPr lang="it-IT" dirty="0"/>
-              <a:t> </a:t>
-            </a:r>
-            <a:r>
-              <a:rPr lang="it-IT" dirty="0" err="1"/>
-              <a:t>content</a:t>
-            </a:r>
-            <a:r>
-              <a:rPr lang="it-IT" dirty="0"/>
-              <a:t> </a:t>
+              <a:rPr lang="en-US" dirty="0"/>
+              <a:t>Exam content </a:t>
             </a:r>
           </a:p>
         </p:txBody>
@@ -5250,7 +5480,7 @@
             </a:r>
             <a:r>
               <a:rPr lang="en-GB" b="1" dirty="0"/>
-              <a:t>in a language of your choice between </a:t>
+              <a:t>in a language you choose between </a:t>
             </a:r>
             <a:r>
               <a:rPr lang="en-GB" dirty="0"/>
@@ -5434,7 +5664,7 @@
         </p:spPr>
         <p:txBody>
           <a:bodyPr>
-            <a:normAutofit fontScale="77500" lnSpcReduction="20000"/>
+            <a:normAutofit/>
           </a:bodyPr>
           <a:lstStyle/>
           <a:p>
@@ -5452,7 +5682,7 @@
           <a:p>
             <a:r>
               <a:rPr lang="en-GB" dirty="0"/>
-              <a:t>Which are the types of windows? List them all and describe the </a:t>
+              <a:t>What are the types of windows? List them all and describe the </a:t>
             </a:r>
             <a:r>
               <a:rPr lang="en-GB" dirty="0" err="1"/>
@@ -5466,12 +5696,6 @@
           <a:p>
             <a:r>
               <a:rPr lang="en-GB" dirty="0"/>
-              <a:t>Which are the types of operations in spark? Illustrate them with a run-time example.</a:t>
-            </a:r>
-          </a:p>
-          <a:p>
-            <a:r>
-              <a:rPr lang="en-GB" dirty="0"/>
               <a:t>Illustrate the programming model of spark structured streaming at the logical and physical level</a:t>
             </a:r>
           </a:p>
@@ -5479,32 +5703,6 @@
             <a:r>
               <a:rPr lang="en-GB" dirty="0"/>
               <a:t>Describe Kafka at a conceptual, logical, system, and physical level</a:t>
-            </a:r>
-          </a:p>
-          <a:p>
-            <a:r>
-              <a:rPr lang="en-GB" dirty="0"/>
-              <a:t>How does </a:t>
-            </a:r>
-            <a:r>
-              <a:rPr lang="en-GB" dirty="0" err="1"/>
-              <a:t>ksqlDB</a:t>
-            </a:r>
-            <a:r>
-              <a:rPr lang="en-GB" dirty="0"/>
-              <a:t> work?</a:t>
-            </a:r>
-          </a:p>
-          <a:p>
-            <a:r>
-              <a:rPr lang="en-GB" dirty="0"/>
-              <a:t>Which types of joins are supported between two streams? Why? </a:t>
-            </a:r>
-          </a:p>
-          <a:p>
-            <a:r>
-              <a:rPr lang="en-GB" dirty="0"/>
-              <a:t>How does Spark Structured Stream treat late arrivals?</a:t>
             </a:r>
           </a:p>
         </p:txBody>
@@ -5612,7 +5810,12 @@
             <p:ph type="title"/>
           </p:nvPr>
         </p:nvSpPr>
-        <p:spPr/>
+        <p:spPr>
+          <a:xfrm>
+            <a:off x="838199" y="365125"/>
+            <a:ext cx="11098428" cy="1325563"/>
+          </a:xfrm>
+        </p:spPr>
         <p:txBody>
           <a:bodyPr>
             <a:normAutofit/>
@@ -5620,34 +5823,21 @@
           <a:lstStyle/>
           <a:p>
             <a:r>
-              <a:rPr lang="it-IT" sz="4000" b="1" dirty="0" err="1"/>
+              <a:rPr lang="en-GB" sz="4000" b="1" dirty="0"/>
               <a:t>Questions</a:t>
             </a:r>
             <a:r>
-              <a:rPr lang="it-IT" sz="4000" dirty="0"/>
+              <a:rPr lang="en-GB" sz="4000" dirty="0"/>
               <a:t> to test the </a:t>
             </a:r>
             <a:r>
               <a:rPr lang="en-GB" sz="4000" b="1" dirty="0"/>
-              <a:t>depth</a:t>
-            </a:r>
-            <a:r>
-              <a:rPr lang="it-IT" sz="4000" dirty="0"/>
-              <a:t> of </a:t>
-            </a:r>
-            <a:r>
-              <a:rPr lang="it-IT" sz="4000" dirty="0" err="1"/>
-              <a:t>your</a:t>
-            </a:r>
-            <a:r>
-              <a:rPr lang="it-IT" sz="4000" dirty="0"/>
-              <a:t> </a:t>
-            </a:r>
-            <a:r>
-              <a:rPr lang="it-IT" sz="4000" dirty="0" err="1"/>
-              <a:t>knowledge</a:t>
-            </a:r>
-            <a:endParaRPr lang="it-IT" sz="4000" dirty="0"/>
+              <a:t>breadth</a:t>
+            </a:r>
+            <a:r>
+              <a:rPr lang="en-GB" sz="4000" dirty="0"/>
+              <a:t> of your knowledge</a:t>
+            </a:r>
           </a:p>
         </p:txBody>
       </p:sp>
@@ -5675,38 +5865,56 @@
         </p:spPr>
         <p:txBody>
           <a:bodyPr>
-            <a:normAutofit fontScale="92500" lnSpcReduction="20000"/>
+            <a:normAutofit/>
           </a:bodyPr>
           <a:lstStyle/>
           <a:p>
             <a:r>
               <a:rPr lang="en-GB" dirty="0"/>
-              <a:t>What’s the difference between the stream-only and the absolute time models? Explain it, proposing examples of queries that can be answered in both models and queries that can be answered only with the absolute time model.</a:t>
-            </a:r>
-          </a:p>
-          <a:p>
+              <a:t>How does </a:t>
+            </a:r>
+            <a:r>
+              <a:rPr lang="en-GB" dirty="0" err="1"/>
+              <a:t>ksqlDB</a:t>
+            </a:r>
             <a:r>
               <a:rPr lang="en-GB" dirty="0"/>
-              <a:t>What’s the difference between the absolute and the interval-based time models? Explain it, proposing examples of queries that can be answered in both models and queries that can be answered only with the interval-based time model.</a:t>
-            </a:r>
-          </a:p>
-          <a:p>
+              <a:t> work? Illustrate the architecture of a </a:t>
+            </a:r>
+            <a:r>
+              <a:rPr lang="en-GB" dirty="0" err="1"/>
+              <a:t>ksqlDB</a:t>
+            </a:r>
             <a:r>
               <a:rPr lang="en-GB" dirty="0"/>
-              <a:t>What are streams and events? How do they relate to each other? Give an example.</a:t>
-            </a:r>
-          </a:p>
-          <a:p>
+              <a:t> server and explain how it coordinates with other </a:t>
+            </a:r>
+            <a:r>
+              <a:rPr lang="en-GB" dirty="0" err="1"/>
+              <a:t>ksqlDB</a:t>
+            </a:r>
             <a:r>
               <a:rPr lang="en-GB" dirty="0"/>
-              <a:t>What is a sliding logical window? Give an example at the conceptual level and show that you know both the EPL syntax and that of another language of your choice. </a:t>
-            </a:r>
-          </a:p>
-          <a:p>
-            <a:endParaRPr lang="en-GB" dirty="0"/>
-          </a:p>
-          <a:p>
-            <a:endParaRPr lang="en-GB" dirty="0"/>
+              <a:t> servers</a:t>
+            </a:r>
+          </a:p>
+          <a:p>
+            <a:r>
+              <a:rPr lang="en-GB" dirty="0"/>
+              <a:t>How is a join performed between a stream and a table? Given an example that illustrates the different results you obtain using an inner, left outer, right outer, or outer join</a:t>
+            </a:r>
+          </a:p>
+          <a:p>
+            <a:r>
+              <a:rPr lang="en-GB" dirty="0"/>
+              <a:t>Under which constraint is it possible to join two streams? Given an example that illustrates the different results you obtain using an inner or a left outer join</a:t>
+            </a:r>
+          </a:p>
+          <a:p>
+            <a:r>
+              <a:rPr lang="en-GB" dirty="0"/>
+              <a:t>How does Spark Structured Stream treat late arrivals?</a:t>
+            </a:r>
           </a:p>
         </p:txBody>
       </p:sp>
@@ -5770,7 +5978,7 @@
     </p:spTree>
     <p:extLst>
       <p:ext uri="{BB962C8B-B14F-4D97-AF65-F5344CB8AC3E}">
-        <p14:creationId xmlns:p14="http://schemas.microsoft.com/office/powerpoint/2010/main" val="3251163112"/>
+        <p14:creationId xmlns:p14="http://schemas.microsoft.com/office/powerpoint/2010/main" val="770447759"/>
       </p:ext>
     </p:extLst>
   </p:cSld>
@@ -5882,13 +6090,25 @@
           <a:p>
             <a:r>
               <a:rPr lang="en-GB" dirty="0"/>
-              <a:t>What is a tumbling logical window? Give an example at the conceptual level and show that you know both the EPL syntax and that of another language of your choice. </a:t>
+              <a:t>What’s the difference between the stream-only and the absolute time models? Explain it, proposing examples of queries that can be answered in both models and queries that can be answered only with the absolute time model.</a:t>
             </a:r>
           </a:p>
           <a:p>
             <a:r>
               <a:rPr lang="en-GB" dirty="0"/>
-              <a:t>What is a tumbling </a:t>
+              <a:t>What’s the difference between the absolute and the interval-based time models? Explain it, proposing examples of queries that can be answered in both models and queries that can be answered only with the interval-based time model.</a:t>
+            </a:r>
+          </a:p>
+          <a:p>
+            <a:r>
+              <a:rPr lang="en-GB" dirty="0"/>
+              <a:t>What are streams and events? How do they relate to each other? Give an example.</a:t>
+            </a:r>
+          </a:p>
+          <a:p>
+            <a:r>
+              <a:rPr lang="en-GB" dirty="0"/>
+              <a:t>What is a </a:t>
             </a:r>
             <a:r>
               <a:rPr lang="en-GB" dirty="0" err="1"/>
@@ -5896,31 +6116,7 @@
             </a:r>
             <a:r>
               <a:rPr lang="en-GB" dirty="0"/>
-              <a:t> window? Give an example at the conceptual level and show that you know both the EPL syntax and that of another language of your choice. </a:t>
-            </a:r>
-          </a:p>
-          <a:p>
-            <a:r>
-              <a:rPr lang="en-GB" dirty="0"/>
-              <a:t>What is the role of the output clause in EPL? Give an example that supports your explanation.</a:t>
-            </a:r>
-          </a:p>
-          <a:p>
-            <a:r>
-              <a:rPr lang="en-GB" dirty="0"/>
-              <a:t>What’s the difference between transformations and actions in spark?</a:t>
-            </a:r>
-          </a:p>
-          <a:p>
-            <a:r>
-              <a:rPr lang="en-GB" dirty="0"/>
-              <a:t>What’s the difference between narrow and wide transformations in spark?</a:t>
-            </a:r>
-          </a:p>
-          <a:p>
-            <a:r>
-              <a:rPr lang="en-GB" dirty="0"/>
-              <a:t>What’s the role of watermarking in Spark Structured Streaming? Support your claims with an example.</a:t>
+              <a:t> logical window? Give an example at the conceptual level and show that you know both the EPL syntax and that of another language of your choice. </a:t>
             </a:r>
           </a:p>
           <a:p>
@@ -5991,7 +6187,7 @@
     </p:spTree>
     <p:extLst>
       <p:ext uri="{BB962C8B-B14F-4D97-AF65-F5344CB8AC3E}">
-        <p14:creationId xmlns:p14="http://schemas.microsoft.com/office/powerpoint/2010/main" val="2904052911"/>
+        <p14:creationId xmlns:p14="http://schemas.microsoft.com/office/powerpoint/2010/main" val="3251163112"/>
       </p:ext>
     </p:extLst>
   </p:cSld>
@@ -6097,74 +6293,29 @@
         </p:spPr>
         <p:txBody>
           <a:bodyPr>
-            <a:normAutofit fontScale="92500" lnSpcReduction="10000"/>
+            <a:normAutofit/>
           </a:bodyPr>
           <a:lstStyle/>
           <a:p>
             <a:r>
               <a:rPr lang="en-GB" dirty="0"/>
-              <a:t>What’s the role of a topic in Kafka?</a:t>
+              <a:t>What is a hopping logical window? Give an example at the conceptual level and show that you know both the EPL syntax and that of another language of your choice. </a:t>
             </a:r>
           </a:p>
           <a:p>
             <a:r>
               <a:rPr lang="en-GB" dirty="0"/>
-              <a:t>What’s the role of a broker in Kafka?</a:t>
+              <a:t>What is the role of the output clause in EPL? Give an example that supports your explanation.</a:t>
             </a:r>
           </a:p>
           <a:p>
             <a:r>
               <a:rPr lang="en-GB" dirty="0"/>
-              <a:t>What’s the role of a partition in Kafka?</a:t>
-            </a:r>
-          </a:p>
-          <a:p>
-            <a:r>
-              <a:rPr lang="en-GB" dirty="0"/>
-              <a:t>What’s the relationship between a consumer, a topic, a broker, a partition, a consumer and a consumer group in Kafka? Explain it using an example.</a:t>
-            </a:r>
-          </a:p>
-          <a:p>
-            <a:r>
-              <a:rPr lang="en-GB" dirty="0"/>
-              <a:t>What’s the difference among a </a:t>
-            </a:r>
-            <a:r>
-              <a:rPr lang="en-GB" dirty="0" err="1"/>
-              <a:t>Kstream</a:t>
-            </a:r>
-            <a:r>
-              <a:rPr lang="en-GB" dirty="0"/>
-              <a:t>, a </a:t>
-            </a:r>
-            <a:r>
-              <a:rPr lang="en-GB" dirty="0" err="1"/>
-              <a:t>Ktable</a:t>
-            </a:r>
-            <a:r>
-              <a:rPr lang="en-GB" dirty="0"/>
-              <a:t> and a topic? Give an example.</a:t>
-            </a:r>
-          </a:p>
-          <a:p>
-            <a:r>
-              <a:rPr lang="en-GB" dirty="0"/>
-              <a:t>What is a session window? Give an example at the conceptual level and show that you know the </a:t>
-            </a:r>
-            <a:r>
-              <a:rPr lang="en-GB" dirty="0" err="1"/>
-              <a:t>ksqlDB</a:t>
-            </a:r>
-            <a:r>
-              <a:rPr lang="en-GB" dirty="0"/>
-              <a:t> syntax</a:t>
-            </a:r>
-          </a:p>
-          <a:p>
-            <a:r>
-              <a:rPr lang="en-GB" dirty="0"/>
-              <a:t>What’s the difference between a pull and a push query in KSQLDB?</a:t>
-            </a:r>
+              <a:t>What’s the role of watermarking in Spark Structured Streaming? How does it interleave with the output mode? Support your claims with an example.</a:t>
+            </a:r>
+          </a:p>
+          <a:p>
+            <a:endParaRPr lang="en-GB" dirty="0"/>
           </a:p>
           <a:p>
             <a:endParaRPr lang="en-GB" dirty="0"/>
@@ -6231,7 +6382,7 @@
     </p:spTree>
     <p:extLst>
       <p:ext uri="{BB962C8B-B14F-4D97-AF65-F5344CB8AC3E}">
-        <p14:creationId xmlns:p14="http://schemas.microsoft.com/office/powerpoint/2010/main" val="356033668"/>
+        <p14:creationId xmlns:p14="http://schemas.microsoft.com/office/powerpoint/2010/main" val="2904052911"/>
       </p:ext>
     </p:extLst>
   </p:cSld>
@@ -6282,18 +6433,34 @@
           <a:lstStyle/>
           <a:p>
             <a:r>
-              <a:rPr lang="en-GB" b="1" dirty="0"/>
-              <a:t>Exercises</a:t>
-            </a:r>
-            <a:r>
-              <a:rPr lang="en-GB" dirty="0"/>
-              <a:t> on </a:t>
-            </a:r>
-            <a:r>
-              <a:rPr lang="en-GB" b="1" dirty="0"/>
-              <a:t>EPL patterns</a:t>
-            </a:r>
-            <a:endParaRPr lang="it-IT" b="1" dirty="0"/>
+              <a:rPr lang="it-IT" sz="4000" b="1" dirty="0" err="1"/>
+              <a:t>Questions</a:t>
+            </a:r>
+            <a:r>
+              <a:rPr lang="it-IT" sz="4000" dirty="0"/>
+              <a:t> to test the </a:t>
+            </a:r>
+            <a:r>
+              <a:rPr lang="en-GB" sz="4000" b="1" dirty="0"/>
+              <a:t>depth</a:t>
+            </a:r>
+            <a:r>
+              <a:rPr lang="it-IT" sz="4000" dirty="0"/>
+              <a:t> of </a:t>
+            </a:r>
+            <a:r>
+              <a:rPr lang="it-IT" sz="4000" dirty="0" err="1"/>
+              <a:t>your</a:t>
+            </a:r>
+            <a:r>
+              <a:rPr lang="it-IT" sz="4000" dirty="0"/>
+              <a:t> </a:t>
+            </a:r>
+            <a:r>
+              <a:rPr lang="it-IT" sz="4000" dirty="0" err="1"/>
+              <a:t>knowledge</a:t>
+            </a:r>
+            <a:endParaRPr lang="it-IT" sz="4000" dirty="0"/>
           </a:p>
         </p:txBody>
       </p:sp>
@@ -6321,145 +6488,40 @@
         </p:spPr>
         <p:txBody>
           <a:bodyPr>
-            <a:normAutofit fontScale="92500" lnSpcReduction="10000"/>
+            <a:normAutofit/>
           </a:bodyPr>
           <a:lstStyle/>
           <a:p>
             <a:r>
               <a:rPr lang="en-GB" dirty="0"/>
-              <a:t>Suppose you receive the following stream of events:</a:t>
-            </a:r>
-          </a:p>
-          <a:p>
-            <a:pPr marL="0" indent="0" algn="ctr">
-              <a:buNone/>
-            </a:pPr>
+              <a:t>What’s the role of a topic in Kafka? How does it relate to partitions and brokers? Explain it using an example.</a:t>
+            </a:r>
+          </a:p>
+          <a:p>
             <a:r>
               <a:rPr lang="en-GB" dirty="0"/>
-              <a:t> </a:t>
-            </a:r>
-            <a:r>
-              <a:rPr lang="en-GB" sz="2000" dirty="0">
-                <a:latin typeface="Courier New" panose="02070309020205020404" pitchFamily="49" charset="0"/>
-                <a:cs typeface="Courier New" panose="02070309020205020404" pitchFamily="49" charset="0"/>
-              </a:rPr>
-              <a:t>A1@0,C1@1,B1@2,B2@3,A2@4,B3@5,A3@6,B4@10.</a:t>
+              <a:t>What’s the role of a broker in Kafka? How does it relate to topics and partitions? Explain it using an example.</a:t>
             </a:r>
           </a:p>
           <a:p>
             <a:r>
               <a:rPr lang="en-GB" dirty="0"/>
-              <a:t>Note that </a:t>
-            </a:r>
-            <a:r>
-              <a:rPr lang="en-GB" dirty="0">
-                <a:latin typeface="Courier New" panose="02070309020205020404" pitchFamily="49" charset="0"/>
-                <a:cs typeface="Courier New" panose="02070309020205020404" pitchFamily="49" charset="0"/>
-              </a:rPr>
-              <a:t>A3@6 </a:t>
-            </a:r>
+              <a:t>What’s the role of a consumer group in Kafka? How does it relate to topics and partitions? Explain it using an example.</a:t>
+            </a:r>
+          </a:p>
+          <a:p>
             <a:r>
               <a:rPr lang="en-GB" dirty="0"/>
-              <a:t>denotes an event of type A identified by the number 3 that is received at time 6.</a:t>
-            </a:r>
-          </a:p>
-          <a:p>
+              <a:t>What is a session window? Give an example at the conceptual level and show that you know the </a:t>
+            </a:r>
+            <a:r>
+              <a:rPr lang="en-GB" dirty="0" err="1"/>
+              <a:t>ksqlDB</a:t>
+            </a:r>
             <a:r>
               <a:rPr lang="en-GB" dirty="0"/>
-              <a:t>Given the patter: </a:t>
-            </a:r>
-            <a:br>
-              <a:rPr lang="en-GB" dirty="0"/>
-            </a:br>
-            <a:r>
-              <a:rPr lang="en-GB" dirty="0"/>
-              <a:t>	</a:t>
-            </a:r>
-            <a:r>
-              <a:rPr lang="en-GB" sz="2000" dirty="0">
-                <a:latin typeface="Courier New" panose="02070309020205020404" pitchFamily="49" charset="0"/>
-                <a:cs typeface="Courier New" panose="02070309020205020404" pitchFamily="49" charset="0"/>
-              </a:rPr>
-              <a:t>every  A  -&gt; (B and not C where </a:t>
-            </a:r>
-            <a:r>
-              <a:rPr lang="en-GB" sz="2000" dirty="0" err="1">
-                <a:latin typeface="Courier New" panose="02070309020205020404" pitchFamily="49" charset="0"/>
-                <a:cs typeface="Courier New" panose="02070309020205020404" pitchFamily="49" charset="0"/>
-              </a:rPr>
-              <a:t>timer:within</a:t>
-            </a:r>
-            <a:r>
-              <a:rPr lang="en-GB" sz="2000" dirty="0">
-                <a:latin typeface="Courier New" panose="02070309020205020404" pitchFamily="49" charset="0"/>
-                <a:cs typeface="Courier New" panose="02070309020205020404" pitchFamily="49" charset="0"/>
-              </a:rPr>
-              <a:t>(3 sec))</a:t>
-            </a:r>
-          </a:p>
-          <a:p>
-            <a:r>
-              <a:rPr lang="en-GB" dirty="0"/>
-              <a:t>Translate the pattern into an English sentence</a:t>
-            </a:r>
-          </a:p>
-          <a:p>
-            <a:r>
-              <a:rPr lang="en-GB" dirty="0"/>
-              <a:t>Which are the events that trigger the matching? Why?</a:t>
-            </a:r>
-          </a:p>
-          <a:p>
-            <a:r>
-              <a:rPr lang="en-GB" dirty="0"/>
-              <a:t>Which are the events that may trigger the matching but are excluded by the semantics of the </a:t>
-            </a:r>
-            <a:r>
-              <a:rPr lang="en-GB" sz="2600" dirty="0">
-                <a:latin typeface="Courier New" panose="02070309020205020404" pitchFamily="49" charset="0"/>
-                <a:cs typeface="Courier New" panose="02070309020205020404" pitchFamily="49" charset="0"/>
-              </a:rPr>
-              <a:t>every</a:t>
-            </a:r>
-            <a:r>
-              <a:rPr lang="en-GB" sz="2800" dirty="0">
-                <a:latin typeface="Courier New" panose="02070309020205020404" pitchFamily="49" charset="0"/>
-                <a:cs typeface="Courier New" panose="02070309020205020404" pitchFamily="49" charset="0"/>
-              </a:rPr>
-              <a:t> </a:t>
-            </a:r>
-            <a:r>
-              <a:rPr lang="en-GB" dirty="0"/>
-              <a:t>and the </a:t>
-            </a:r>
-            <a:r>
-              <a:rPr lang="en-GB" sz="2600" dirty="0">
-                <a:latin typeface="Courier New" panose="02070309020205020404" pitchFamily="49" charset="0"/>
-                <a:cs typeface="Courier New" panose="02070309020205020404" pitchFamily="49" charset="0"/>
-              </a:rPr>
-              <a:t>where </a:t>
-            </a:r>
-            <a:r>
-              <a:rPr lang="en-GB" sz="2600" dirty="0" err="1">
-                <a:latin typeface="Courier New" panose="02070309020205020404" pitchFamily="49" charset="0"/>
-                <a:cs typeface="Courier New" panose="02070309020205020404" pitchFamily="49" charset="0"/>
-              </a:rPr>
-              <a:t>timer:within</a:t>
-            </a:r>
-            <a:r>
-              <a:rPr lang="en-GB" sz="2600" dirty="0">
-                <a:latin typeface="Courier New" panose="02070309020205020404" pitchFamily="49" charset="0"/>
-                <a:cs typeface="Courier New" panose="02070309020205020404" pitchFamily="49" charset="0"/>
-              </a:rPr>
-              <a:t> </a:t>
-            </a:r>
-            <a:r>
-              <a:rPr lang="en-GB" dirty="0"/>
-              <a:t>clauses? Why?</a:t>
-            </a:r>
-          </a:p>
-          <a:p>
-            <a:endParaRPr lang="en-GB" dirty="0"/>
+              <a:t> syntax</a:t>
+            </a:r>
           </a:p>
         </p:txBody>
       </p:sp>
@@ -6523,7 +6585,7 @@
     </p:spTree>
     <p:extLst>
       <p:ext uri="{BB962C8B-B14F-4D97-AF65-F5344CB8AC3E}">
-        <p14:creationId xmlns:p14="http://schemas.microsoft.com/office/powerpoint/2010/main" val="1823437186"/>
+        <p14:creationId xmlns:p14="http://schemas.microsoft.com/office/powerpoint/2010/main" val="356033668"/>
       </p:ext>
     </p:extLst>
   </p:cSld>
@@ -6566,12 +6628,7 @@
             <p:ph type="title"/>
           </p:nvPr>
         </p:nvSpPr>
-        <p:spPr>
-          <a:xfrm>
-            <a:off x="838199" y="365125"/>
-            <a:ext cx="10791091" cy="1325563"/>
-          </a:xfrm>
-        </p:spPr>
+        <p:spPr/>
         <p:txBody>
           <a:bodyPr>
             <a:normAutofit/>
@@ -6579,18 +6636,18 @@
           <a:lstStyle/>
           <a:p>
             <a:r>
-              <a:rPr lang="en-GB" sz="4000" b="1" dirty="0"/>
+              <a:rPr lang="en-GB" b="1" dirty="0"/>
               <a:t>Exercises</a:t>
             </a:r>
             <a:r>
-              <a:rPr lang="en-GB" sz="4000" dirty="0"/>
+              <a:rPr lang="en-GB" dirty="0"/>
               <a:t> on </a:t>
             </a:r>
             <a:r>
-              <a:rPr lang="en-GB" sz="4000" b="1" dirty="0"/>
-              <a:t>a Streaming Data Engineering problem</a:t>
-            </a:r>
-            <a:endParaRPr lang="it-IT" sz="4000" b="1" dirty="0"/>
+              <a:rPr lang="en-GB" b="1" dirty="0"/>
+              <a:t>EPL patterns</a:t>
+            </a:r>
+            <a:endParaRPr lang="it-IT" b="1" dirty="0"/>
           </a:p>
         </p:txBody>
       </p:sp>
@@ -6618,95 +6675,145 @@
         </p:spPr>
         <p:txBody>
           <a:bodyPr>
-            <a:normAutofit/>
+            <a:normAutofit fontScale="92500" lnSpcReduction="10000"/>
           </a:bodyPr>
           <a:lstStyle/>
           <a:p>
             <a:r>
               <a:rPr lang="en-GB" dirty="0"/>
-              <a:t>In the git repo of the course you find a complete example about a Robotic Arm solved in</a:t>
-            </a:r>
-          </a:p>
-          <a:p>
-            <a:pPr lvl="1"/>
+              <a:t>Suppose you receive the following stream of events:</a:t>
+            </a:r>
+          </a:p>
+          <a:p>
+            <a:pPr marL="0" indent="0" algn="ctr">
+              <a:buNone/>
+            </a:pPr>
             <a:r>
               <a:rPr lang="en-GB" dirty="0"/>
-              <a:t>EPL</a:t>
-            </a:r>
-          </a:p>
-          <a:p>
-            <a:pPr lvl="2"/>
-            <a:r>
-              <a:rPr lang="en-GB" sz="1800" dirty="0">
-                <a:hlinkClick r:id="rId2"/>
+              <a:t> </a:t>
+            </a:r>
+            <a:r>
+              <a:rPr lang="en-GB" sz="2000" dirty="0">
+                <a:latin typeface="Courier New" panose="02070309020205020404" pitchFamily="49" charset="0"/>
+                <a:cs typeface="Courier New" panose="02070309020205020404" pitchFamily="49" charset="0"/>
               </a:rPr>
-              <a:t>https://github.com/emanueledellavalle/streaming-data-analytics/tree/main/codes/epl_robotic-arm</a:t>
-            </a:r>
-            <a:r>
-              <a:rPr lang="en-GB" sz="1800" dirty="0"/>
+              <a:t>A1@0,C1@1,B1@2,B2@3,A2@4,B3@5,A3@6,B4@10.</a:t>
+            </a:r>
+          </a:p>
+          <a:p>
+            <a:r>
+              <a:rPr lang="en-GB" dirty="0"/>
+              <a:t>Note that </a:t>
+            </a:r>
+            <a:r>
+              <a:rPr lang="en-GB" dirty="0">
+                <a:latin typeface="Courier New" panose="02070309020205020404" pitchFamily="49" charset="0"/>
+                <a:cs typeface="Courier New" panose="02070309020205020404" pitchFamily="49" charset="0"/>
+              </a:rPr>
+              <a:t>A3@6 </a:t>
+            </a:r>
+            <a:r>
+              <a:rPr lang="en-GB" dirty="0"/>
+              <a:t>denotes an event of type A identified by the number 3 that is received at time 6.</a:t>
+            </a:r>
+          </a:p>
+          <a:p>
+            <a:r>
+              <a:rPr lang="en-GB" dirty="0"/>
+              <a:t>Given the patter: </a:t>
+            </a:r>
+            <a:br>
+              <a:rPr lang="en-GB" dirty="0"/>
+            </a:br>
+            <a:r>
+              <a:rPr lang="en-GB" dirty="0"/>
+              <a:t>	</a:t>
+            </a:r>
+            <a:r>
+              <a:rPr lang="en-GB" sz="2000" dirty="0">
+                <a:latin typeface="Courier New" panose="02070309020205020404" pitchFamily="49" charset="0"/>
+                <a:cs typeface="Courier New" panose="02070309020205020404" pitchFamily="49" charset="0"/>
+              </a:rPr>
+              <a:t>every  A  -&gt; (B and not C where </a:t>
+            </a:r>
+            <a:r>
+              <a:rPr lang="en-GB" sz="2000" dirty="0" err="1">
+                <a:latin typeface="Courier New" panose="02070309020205020404" pitchFamily="49" charset="0"/>
+                <a:cs typeface="Courier New" panose="02070309020205020404" pitchFamily="49" charset="0"/>
+              </a:rPr>
+              <a:t>timer:within</a:t>
+            </a:r>
+            <a:r>
+              <a:rPr lang="en-GB" sz="2000" dirty="0">
+                <a:latin typeface="Courier New" panose="02070309020205020404" pitchFamily="49" charset="0"/>
+                <a:cs typeface="Courier New" panose="02070309020205020404" pitchFamily="49" charset="0"/>
+              </a:rPr>
+              <a:t>(3 sec))</a:t>
+            </a:r>
+          </a:p>
+          <a:p>
+            <a:r>
+              <a:rPr lang="en-GB" dirty="0"/>
+              <a:t>Translate the pattern into an English sentence</a:t>
+            </a:r>
+          </a:p>
+          <a:p>
+            <a:r>
+              <a:rPr lang="en-GB" dirty="0"/>
+              <a:t>Which are the events that trigger the matching? Why?</a:t>
+            </a:r>
+          </a:p>
+          <a:p>
+            <a:r>
+              <a:rPr lang="en-GB" dirty="0"/>
+              <a:t>Which are the events that may trigger the matching but are excluded by the semantics of the </a:t>
+            </a:r>
+            <a:r>
+              <a:rPr lang="en-GB" sz="2600" dirty="0">
+                <a:latin typeface="Courier New" panose="02070309020205020404" pitchFamily="49" charset="0"/>
+                <a:cs typeface="Courier New" panose="02070309020205020404" pitchFamily="49" charset="0"/>
+              </a:rPr>
+              <a:t>every</a:t>
+            </a:r>
+            <a:r>
+              <a:rPr lang="en-GB" sz="2800" dirty="0">
+                <a:latin typeface="Courier New" panose="02070309020205020404" pitchFamily="49" charset="0"/>
+                <a:cs typeface="Courier New" panose="02070309020205020404" pitchFamily="49" charset="0"/>
+              </a:rPr>
               <a:t> </a:t>
             </a:r>
-          </a:p>
-          <a:p>
-            <a:pPr lvl="1"/>
             <a:r>
               <a:rPr lang="en-GB" dirty="0"/>
-              <a:t>Spark Structured Streaming</a:t>
-            </a:r>
-          </a:p>
-          <a:p>
-            <a:pPr lvl="2"/>
-            <a:r>
-              <a:rPr lang="en-GB" sz="1800" dirty="0">
-                <a:hlinkClick r:id="rId3"/>
+              <a:t>and the </a:t>
+            </a:r>
+            <a:r>
+              <a:rPr lang="en-GB" sz="2600" dirty="0">
+                <a:latin typeface="Courier New" panose="02070309020205020404" pitchFamily="49" charset="0"/>
+                <a:cs typeface="Courier New" panose="02070309020205020404" pitchFamily="49" charset="0"/>
               </a:rPr>
-              <a:t>https://github.com/emanueledellavalle/streaming-data-analytics/tree/main/codes/sss_robotic-arm</a:t>
-            </a:r>
-            <a:r>
-              <a:rPr lang="en-GB" sz="1800" dirty="0"/>
+              <a:t>where </a:t>
+            </a:r>
+            <a:r>
+              <a:rPr lang="en-GB" sz="2600" dirty="0" err="1">
+                <a:latin typeface="Courier New" panose="02070309020205020404" pitchFamily="49" charset="0"/>
+                <a:cs typeface="Courier New" panose="02070309020205020404" pitchFamily="49" charset="0"/>
+              </a:rPr>
+              <a:t>timer:within</a:t>
+            </a:r>
+            <a:r>
+              <a:rPr lang="en-GB" sz="2600" dirty="0">
+                <a:latin typeface="Courier New" panose="02070309020205020404" pitchFamily="49" charset="0"/>
+                <a:cs typeface="Courier New" panose="02070309020205020404" pitchFamily="49" charset="0"/>
+              </a:rPr>
               <a:t> </a:t>
             </a:r>
+            <a:r>
+              <a:rPr lang="en-GB" dirty="0"/>
+              <a:t>clauses? Why?</a:t>
+            </a:r>
+          </a:p>
+          <a:p>
             <a:endParaRPr lang="en-GB" dirty="0"/>
-          </a:p>
-          <a:p>
-            <a:pPr lvl="1"/>
-            <a:r>
-              <a:rPr lang="en-GB" dirty="0" err="1"/>
-              <a:t>ksqlDB</a:t>
-            </a:r>
-            <a:endParaRPr lang="en-GB" dirty="0"/>
-          </a:p>
-          <a:p>
-            <a:pPr lvl="2"/>
-            <a:r>
-              <a:rPr lang="en-GB" sz="1800" dirty="0">
-                <a:hlinkClick r:id="rId4"/>
-              </a:rPr>
-              <a:t>https://github.com/emanueledellavalle/streaming-data-analytics/tree/main/codes/ksql_robotic-arm</a:t>
-            </a:r>
-            <a:r>
-              <a:rPr lang="en-GB" sz="1800" dirty="0"/>
-              <a:t> </a:t>
-            </a:r>
-          </a:p>
-          <a:p>
-            <a:r>
-              <a:rPr lang="en-GB" dirty="0"/>
-              <a:t>There is also another example completely solved in EPL about drones picking tomatoes</a:t>
-            </a:r>
-          </a:p>
-          <a:p>
-            <a:pPr lvl="1"/>
-            <a:r>
-              <a:rPr lang="en-GB" sz="1800" dirty="0">
-                <a:hlinkClick r:id="rId5"/>
-              </a:rPr>
-              <a:t>https://github.com/emanueledellavalle/streaming-data-analytics/tree/main/codes/epl_tomatopick</a:t>
-            </a:r>
-            <a:r>
-              <a:rPr lang="en-GB" sz="1800" dirty="0"/>
-              <a:t> </a:t>
-            </a:r>
           </a:p>
         </p:txBody>
       </p:sp>
@@ -6770,7 +6877,7 @@
     </p:spTree>
     <p:extLst>
       <p:ext uri="{BB962C8B-B14F-4D97-AF65-F5344CB8AC3E}">
-        <p14:creationId xmlns:p14="http://schemas.microsoft.com/office/powerpoint/2010/main" val="3410039972"/>
+        <p14:creationId xmlns:p14="http://schemas.microsoft.com/office/powerpoint/2010/main" val="1823437186"/>
       </p:ext>
     </p:extLst>
   </p:cSld>
@@ -6799,90 +6906,10 @@
       </p:grpSpPr>
       <p:sp>
         <p:nvSpPr>
-          <p:cNvPr id="2" name="Subtitle 1">
-            <a:extLst>
-              <a:ext uri="{FF2B5EF4-FFF2-40B4-BE49-F238E27FC236}">
-                <a16:creationId xmlns:a16="http://schemas.microsoft.com/office/drawing/2014/main" id="{5844CE45-509E-F649-90A4-98FCBA6E2423}"/>
-              </a:ext>
-            </a:extLst>
-          </p:cNvPr>
-          <p:cNvSpPr>
-            <a:spLocks noGrp="1"/>
-          </p:cNvSpPr>
-          <p:nvPr>
-            <p:ph type="subTitle" idx="1"/>
-          </p:nvPr>
-        </p:nvSpPr>
-        <p:spPr/>
-        <p:txBody>
-          <a:bodyPr/>
-          <a:lstStyle/>
-          <a:p>
-            <a:pPr marL="177796" indent="-177796">
-              <a:spcBef>
-                <a:spcPts val="0"/>
-              </a:spcBef>
-              <a:buClr>
-                <a:schemeClr val="lt1"/>
-              </a:buClr>
-              <a:buSzPts val="1800"/>
-            </a:pPr>
-            <a:r>
-              <a:rPr lang="en" b="1" dirty="0">
-                <a:solidFill>
-                  <a:schemeClr val="tx1"/>
-                </a:solidFill>
-                <a:latin typeface="Helvetica Neue Light"/>
-                <a:ea typeface="Helvetica Neue Light"/>
-                <a:cs typeface="Helvetica Neue Light"/>
-                <a:sym typeface="Helvetica Neue Light"/>
-              </a:rPr>
-              <a:t>Emanuele Della Valle</a:t>
-            </a:r>
-          </a:p>
-          <a:p>
-            <a:pPr marL="177796" indent="-177796">
-              <a:spcBef>
-                <a:spcPts val="0"/>
-              </a:spcBef>
-              <a:buClr>
-                <a:schemeClr val="lt1"/>
-              </a:buClr>
-              <a:buSzPts val="1800"/>
-            </a:pPr>
-            <a:r>
-              <a:rPr lang="en" sz="1800" dirty="0" err="1">
-                <a:solidFill>
-                  <a:schemeClr val="tx1"/>
-                </a:solidFill>
-                <a:latin typeface="Helvetica Neue Light"/>
-                <a:ea typeface="Helvetica Neue Light"/>
-                <a:cs typeface="Helvetica Neue Light"/>
-                <a:sym typeface="Helvetica Neue Light"/>
-              </a:rPr>
-              <a:t>Politecnico</a:t>
-            </a:r>
-            <a:r>
-              <a:rPr lang="en" sz="1800" dirty="0">
-                <a:solidFill>
-                  <a:schemeClr val="tx1"/>
-                </a:solidFill>
-                <a:latin typeface="Helvetica Neue Light"/>
-                <a:ea typeface="Helvetica Neue Light"/>
-                <a:cs typeface="Helvetica Neue Light"/>
-                <a:sym typeface="Helvetica Neue Light"/>
-              </a:rPr>
-              <a:t> di Milano </a:t>
-            </a:r>
-          </a:p>
-        </p:txBody>
-      </p:sp>
-      <p:sp>
-        <p:nvSpPr>
-          <p:cNvPr id="3" name="Title 2">
-            <a:extLst>
-              <a:ext uri="{FF2B5EF4-FFF2-40B4-BE49-F238E27FC236}">
-                <a16:creationId xmlns:a16="http://schemas.microsoft.com/office/drawing/2014/main" id="{05E3092D-C75E-7446-AFAD-75E4D4F36537}"/>
+          <p:cNvPr id="9" name="Title 8">
+            <a:extLst>
+              <a:ext uri="{FF2B5EF4-FFF2-40B4-BE49-F238E27FC236}">
+                <a16:creationId xmlns:a16="http://schemas.microsoft.com/office/drawing/2014/main" id="{885E2613-CFFE-8746-BB6F-5FF859931508}"/>
               </a:ext>
             </a:extLst>
           </p:cNvPr>
@@ -6895,129 +6922,227 @@
         </p:nvSpPr>
         <p:spPr>
           <a:xfrm>
-            <a:off x="960228" y="2531006"/>
-            <a:ext cx="6777003" cy="1795989"/>
+            <a:off x="838199" y="365125"/>
+            <a:ext cx="10791091" cy="1325563"/>
           </a:xfrm>
         </p:spPr>
         <p:txBody>
-          <a:bodyPr/>
-          <a:lstStyle/>
-          <a:p>
-            <a:r>
-              <a:rPr lang="en" sz="2000" b="1">
-                <a:solidFill>
-                  <a:schemeClr val="tx1"/>
-                </a:solidFill>
-              </a:rPr>
-              <a:t>Streaming Data Analytics </a:t>
-            </a:r>
-            <a:br>
-              <a:rPr lang="en" sz="3200" b="1">
-                <a:solidFill>
-                  <a:schemeClr val="tx1"/>
-                </a:solidFill>
-              </a:rPr>
-            </a:br>
-            <a:r>
-              <a:rPr lang="en" sz="3200" b="1">
-                <a:solidFill>
-                  <a:schemeClr val="tx1"/>
-                </a:solidFill>
-              </a:rPr>
-              <a:t>Preview of the </a:t>
-            </a:r>
-            <a:br>
-              <a:rPr lang="en" sz="3200" b="1">
-                <a:solidFill>
-                  <a:schemeClr val="tx1"/>
-                </a:solidFill>
-              </a:rPr>
-            </a:br>
-            <a:r>
-              <a:rPr lang="en" sz="3200" b="1">
-                <a:solidFill>
-                  <a:schemeClr val="tx1"/>
-                </a:solidFill>
-              </a:rPr>
-              <a:t>part of the exam about </a:t>
-            </a:r>
-            <a:br>
-              <a:rPr lang="en" sz="3200" b="1">
-                <a:solidFill>
-                  <a:schemeClr val="tx1"/>
-                </a:solidFill>
-              </a:rPr>
-            </a:br>
-            <a:r>
-              <a:rPr lang="en" sz="3200" b="1">
-                <a:solidFill>
-                  <a:schemeClr val="tx1"/>
-                </a:solidFill>
-              </a:rPr>
-              <a:t>Streaming Data Engineering</a:t>
-            </a:r>
-            <a:endParaRPr lang="en-US" sz="4267" b="1" dirty="0">
-              <a:solidFill>
-                <a:schemeClr val="tx1"/>
-              </a:solidFill>
-            </a:endParaRPr>
-          </a:p>
-        </p:txBody>
-      </p:sp>
-      <p:sp>
-        <p:nvSpPr>
-          <p:cNvPr id="4" name="TextBox 3">
-            <a:extLst>
-              <a:ext uri="{FF2B5EF4-FFF2-40B4-BE49-F238E27FC236}">
-                <a16:creationId xmlns:a16="http://schemas.microsoft.com/office/drawing/2014/main" id="{8B388D4E-0571-CE4D-A7E6-D64A0DA6C4F5}"/>
-              </a:ext>
-            </a:extLst>
-          </p:cNvPr>
-          <p:cNvSpPr txBox="1"/>
-          <p:nvPr/>
+          <a:bodyPr>
+            <a:normAutofit/>
+          </a:bodyPr>
+          <a:lstStyle/>
+          <a:p>
+            <a:r>
+              <a:rPr lang="en-GB" sz="4000" b="1" dirty="0"/>
+              <a:t>Exercises</a:t>
+            </a:r>
+            <a:r>
+              <a:rPr lang="en-GB" sz="4000" dirty="0"/>
+              <a:t> on </a:t>
+            </a:r>
+            <a:r>
+              <a:rPr lang="en-GB" sz="4000" b="1" dirty="0"/>
+              <a:t>a Streaming Data Engineering problem</a:t>
+            </a:r>
+            <a:endParaRPr lang="it-IT" sz="4000" b="1" dirty="0"/>
+          </a:p>
+        </p:txBody>
+      </p:sp>
+      <p:sp>
+        <p:nvSpPr>
+          <p:cNvPr id="10" name="Content Placeholder 9">
+            <a:extLst>
+              <a:ext uri="{FF2B5EF4-FFF2-40B4-BE49-F238E27FC236}">
+                <a16:creationId xmlns:a16="http://schemas.microsoft.com/office/drawing/2014/main" id="{74517F86-4B29-7742-9D41-82F9D9CAC7B3}"/>
+              </a:ext>
+            </a:extLst>
+          </p:cNvPr>
+          <p:cNvSpPr>
+            <a:spLocks noGrp="1"/>
+          </p:cNvSpPr>
+          <p:nvPr>
+            <p:ph idx="1"/>
+          </p:nvPr>
         </p:nvSpPr>
         <p:spPr>
           <a:xfrm>
-            <a:off x="3087445" y="4098664"/>
-            <a:ext cx="184731" cy="369332"/>
+            <a:off x="838200" y="1825625"/>
+            <a:ext cx="10791092" cy="4351339"/>
           </a:xfrm>
-          <a:prstGeom prst="rect">
-            <a:avLst/>
-          </a:prstGeom>
-          <a:noFill/>
         </p:spPr>
         <p:txBody>
-          <a:bodyPr wrap="none" rtlCol="0">
-            <a:spAutoFit/>
+          <a:bodyPr>
+            <a:normAutofit/>
           </a:bodyPr>
           <a:lstStyle/>
           <a:p>
-            <a:endParaRPr lang="it-IT" dirty="0"/>
+            <a:r>
+              <a:rPr lang="en-GB" dirty="0"/>
+              <a:t>In the git repo of the course you find a complete example about a Robotic Arm solved in</a:t>
+            </a:r>
+          </a:p>
+          <a:p>
+            <a:pPr lvl="1"/>
+            <a:r>
+              <a:rPr lang="en-GB" dirty="0"/>
+              <a:t>EPL</a:t>
+            </a:r>
+          </a:p>
+          <a:p>
+            <a:pPr lvl="2"/>
+            <a:r>
+              <a:rPr lang="en-GB" sz="1800" dirty="0">
+                <a:hlinkClick r:id="rId2"/>
+              </a:rPr>
+              <a:t>https://github.com/emanueledellavalle/streaming-data-analytics/tree/main/codes/epl_robotic-arm</a:t>
+            </a:r>
+            <a:r>
+              <a:rPr lang="en-GB" sz="1800" dirty="0"/>
+              <a:t> </a:t>
+            </a:r>
+          </a:p>
+          <a:p>
+            <a:pPr lvl="1"/>
+            <a:r>
+              <a:rPr lang="en-GB" dirty="0" err="1"/>
+              <a:t>ksqlDB</a:t>
+            </a:r>
+            <a:endParaRPr lang="en-GB" dirty="0"/>
+          </a:p>
+          <a:p>
+            <a:pPr lvl="2"/>
+            <a:r>
+              <a:rPr lang="en-GB" sz="1800" dirty="0">
+                <a:hlinkClick r:id="rId3"/>
+              </a:rPr>
+              <a:t>https://github.com/emanueledellavalle/streaming-data-analytics/tree/main/codes/ksql_robotic-arm</a:t>
+            </a:r>
+            <a:r>
+              <a:rPr lang="en-GB" sz="1800" dirty="0"/>
+              <a:t> </a:t>
+            </a:r>
+          </a:p>
+          <a:p>
+            <a:pPr lvl="1"/>
+            <a:r>
+              <a:rPr lang="en-GB" dirty="0"/>
+              <a:t>Spark Structured Streaming</a:t>
+            </a:r>
+          </a:p>
+          <a:p>
+            <a:pPr lvl="2"/>
+            <a:r>
+              <a:rPr lang="en-GB" sz="1800" dirty="0">
+                <a:hlinkClick r:id="rId4"/>
+              </a:rPr>
+              <a:t>https://github.com/emanueledellavalle/streaming-data-analytics/tree/main/codes/sss_robotic-arm</a:t>
+            </a:r>
+            <a:r>
+              <a:rPr lang="en-GB" sz="1800" dirty="0"/>
+              <a:t> </a:t>
+            </a:r>
+          </a:p>
+          <a:p>
+            <a:r>
+              <a:rPr lang="en-GB" dirty="0"/>
+              <a:t>There are other two example completely solved in EPL</a:t>
+            </a:r>
+          </a:p>
+          <a:p>
+            <a:pPr lvl="1"/>
+            <a:r>
+              <a:rPr lang="en-GB" sz="1800" dirty="0">
+                <a:hlinkClick r:id="rId5"/>
+              </a:rPr>
+              <a:t>https://github.com/emanueledellavalle/streaming-data-analytics/tree/main/codes/epl_tomatopick</a:t>
+            </a:r>
+            <a:r>
+              <a:rPr lang="en-GB" sz="1800" dirty="0"/>
+              <a:t> </a:t>
+            </a:r>
+          </a:p>
+          <a:p>
+            <a:pPr lvl="1"/>
+            <a:r>
+              <a:rPr lang="en-GB" sz="1800" dirty="0">
+                <a:hlinkClick r:id="rId6"/>
+              </a:rPr>
+              <a:t>https://github.com/emanueledellavalle/streaming-data-analytics/tree/main/codes/epl_bocce</a:t>
+            </a:r>
+            <a:r>
+              <a:rPr lang="en-GB" sz="1800" dirty="0"/>
+              <a:t> </a:t>
+            </a:r>
+          </a:p>
+        </p:txBody>
+      </p:sp>
+      <p:sp>
+        <p:nvSpPr>
+          <p:cNvPr id="7" name="Footer Placeholder 6">
+            <a:extLst>
+              <a:ext uri="{FF2B5EF4-FFF2-40B4-BE49-F238E27FC236}">
+                <a16:creationId xmlns:a16="http://schemas.microsoft.com/office/drawing/2014/main" id="{0C5A1F71-D77F-5049-B6DB-FD7CA69ED1CE}"/>
+              </a:ext>
+            </a:extLst>
+          </p:cNvPr>
+          <p:cNvSpPr>
+            <a:spLocks noGrp="1"/>
+          </p:cNvSpPr>
+          <p:nvPr>
+            <p:ph type="ftr" sz="quarter" idx="11"/>
+          </p:nvPr>
+        </p:nvSpPr>
+        <p:spPr/>
+        <p:txBody>
+          <a:bodyPr/>
+          <a:lstStyle/>
+          <a:p>
+            <a:r>
+              <a:rPr lang="en-US"/>
+              <a:t>Emanuele Della Valle - http://emanueledellavalle.org</a:t>
+            </a:r>
+          </a:p>
+        </p:txBody>
+      </p:sp>
+      <p:sp>
+        <p:nvSpPr>
+          <p:cNvPr id="8" name="Slide Number Placeholder 7">
+            <a:extLst>
+              <a:ext uri="{FF2B5EF4-FFF2-40B4-BE49-F238E27FC236}">
+                <a16:creationId xmlns:a16="http://schemas.microsoft.com/office/drawing/2014/main" id="{9316B443-3F82-BD42-92CF-B32FAD9B5193}"/>
+              </a:ext>
+            </a:extLst>
+          </p:cNvPr>
+          <p:cNvSpPr>
+            <a:spLocks noGrp="1"/>
+          </p:cNvSpPr>
+          <p:nvPr>
+            <p:ph type="sldNum" sz="quarter" idx="12"/>
+          </p:nvPr>
+        </p:nvSpPr>
+        <p:spPr/>
+        <p:txBody>
+          <a:bodyPr/>
+          <a:lstStyle/>
+          <a:p>
+            <a:fld id="{463394A2-5689-C845-95DB-27F089FB77B0}" type="slidenum">
+              <a:rPr lang="en-US" smtClean="0"/>
+              <a:t>9</a:t>
+            </a:fld>
+            <a:endParaRPr lang="en-US"/>
           </a:p>
         </p:txBody>
       </p:sp>
     </p:spTree>
     <p:extLst>
       <p:ext uri="{BB962C8B-B14F-4D97-AF65-F5344CB8AC3E}">
-        <p14:creationId xmlns:p14="http://schemas.microsoft.com/office/powerpoint/2010/main" val="1485291633"/>
+        <p14:creationId xmlns:p14="http://schemas.microsoft.com/office/powerpoint/2010/main" val="3410039972"/>
       </p:ext>
     </p:extLst>
   </p:cSld>
   <p:clrMapOvr>
     <a:masterClrMapping/>
   </p:clrMapOvr>
-  <mc:AlternateContent xmlns:mc="http://schemas.openxmlformats.org/markup-compatibility/2006" xmlns:p14="http://schemas.microsoft.com/office/powerpoint/2010/main">
-    <mc:Choice Requires="p14">
-      <p:transition spd="med" p14:dur="700">
-        <p:fade/>
-      </p:transition>
-    </mc:Choice>
-    <mc:Fallback xmlns="">
-      <p:transition spd="med">
-        <p:fade/>
-      </p:transition>
-    </mc:Fallback>
-  </mc:AlternateContent>
 </p:sld>
 </file>
 

</xml_diff>

<commit_message>
slides after 26.10.2023 lecture
</commit_message>
<xml_diff>
--- a/lectures/07_SDE_exam-preview/07_Streaming-Data-Engineering_exam-preview.pptx
+++ b/lectures/07_SDE_exam-preview/07_Streaming-Data-Engineering_exam-preview.pptx
@@ -5702,7 +5702,15 @@
           <a:p>
             <a:r>
               <a:rPr lang="en-GB" dirty="0"/>
-              <a:t>Describe Kafka at a conceptual, logical, system, and physical level</a:t>
+              <a:t>Describe Kafka at </a:t>
+            </a:r>
+            <a:r>
+              <a:rPr lang="en-GB"/>
+              <a:t>a conceptual, </a:t>
+            </a:r>
+            <a:r>
+              <a:rPr lang="en-GB" dirty="0"/>
+              <a:t>system, and physical level</a:t>
             </a:r>
           </a:p>
         </p:txBody>

</xml_diff>